<commit_message>
added Microsoft Teams as technology to slide 5
</commit_message>
<xml_diff>
--- a/string project presentation.pptx
+++ b/string project presentation.pptx
@@ -122,8 +122,10 @@
 <file path=ppt/revisionInfo.xml><?xml version="1.0" encoding="utf-8"?>
 <p1510:revInfo xmlns:a="http://schemas.openxmlformats.org/drawingml/2006/main" xmlns:r="http://schemas.openxmlformats.org/officeDocument/2006/relationships" xmlns:p1510="http://schemas.microsoft.com/office/powerpoint/2015/10/main">
   <p1510:revLst>
+    <p1510:client id="{2B3F8242-E684-F736-2FD3-510992178C56}" v="80" dt="2020-06-12T18:10:33.208"/>
     <p1510:client id="{C223C9D8-F413-E9CB-82B7-72381825DD07}" v="889" dt="2020-06-10T19:07:23.105"/>
     <p1510:client id="{C715FDFE-E211-DE94-2565-0F26D7F5D117}" v="677" dt="2020-06-10T19:07:18.682"/>
+    <p1510:client id="{CB06CF89-B87C-CD7A-D0D9-D2042E913405}" v="27" dt="2020-06-11T06:43:23.149"/>
     <p1510:client id="{EEF18986-AE38-5220-2DEC-82ADA5832303}" v="349" dt="2020-06-10T18:07:35.890"/>
   </p1510:revLst>
 </p1510:revInfo>
@@ -1824,12 +1826,24 @@
             </a:lnSpc>
           </a:pPr>
           <a:r>
+            <a:rPr lang="bg-BG" err="1">
+              <a:latin typeface="Corbel" panose="020B0503020204020204"/>
+            </a:rPr>
+            <a:t>Our</a:t>
+          </a:r>
+          <a:r>
             <a:rPr lang="bg-BG">
               <a:latin typeface="Corbel" panose="020B0503020204020204"/>
             </a:rPr>
-            <a:t>Our team</a:t>
+            <a:t> </a:t>
           </a:r>
-          <a:endParaRPr lang="en-US"/>
+          <a:r>
+            <a:rPr lang="bg-BG" err="1">
+              <a:latin typeface="Corbel" panose="020B0503020204020204"/>
+            </a:rPr>
+            <a:t>team</a:t>
+          </a:r>
+          <a:endParaRPr lang="en-US" err="1"/>
         </a:p>
       </dgm:t>
     </dgm:pt>
@@ -1868,12 +1882,24 @@
             </a:lnSpc>
           </a:pPr>
           <a:r>
+            <a:rPr lang="bg-BG" err="1">
+              <a:latin typeface="Corbel" panose="020B0503020204020204"/>
+            </a:rPr>
+            <a:t>Future</a:t>
+          </a:r>
+          <a:r>
             <a:rPr lang="bg-BG">
               <a:latin typeface="Corbel" panose="020B0503020204020204"/>
             </a:rPr>
-            <a:t>Future plans</a:t>
+            <a:t> </a:t>
           </a:r>
-          <a:endParaRPr lang="en-US"/>
+          <a:r>
+            <a:rPr lang="bg-BG" err="1">
+              <a:latin typeface="Corbel" panose="020B0503020204020204"/>
+            </a:rPr>
+            <a:t>plans</a:t>
+          </a:r>
+          <a:endParaRPr lang="en-US" err="1"/>
         </a:p>
       </dgm:t>
     </dgm:pt>
@@ -1912,12 +1938,48 @@
             </a:lnSpc>
           </a:pPr>
           <a:r>
+            <a:rPr lang="bg-BG" err="1">
+              <a:latin typeface="Corbel" panose="020B0503020204020204"/>
+            </a:rPr>
+            <a:t>Idea</a:t>
+          </a:r>
+          <a:r>
             <a:rPr lang="bg-BG">
               <a:latin typeface="Corbel" panose="020B0503020204020204"/>
             </a:rPr>
-            <a:t>Idea of the project</a:t>
+            <a:t> </a:t>
           </a:r>
-          <a:endParaRPr lang="en-US"/>
+          <a:r>
+            <a:rPr lang="bg-BG" err="1">
+              <a:latin typeface="Corbel" panose="020B0503020204020204"/>
+            </a:rPr>
+            <a:t>of</a:t>
+          </a:r>
+          <a:r>
+            <a:rPr lang="bg-BG">
+              <a:latin typeface="Corbel" panose="020B0503020204020204"/>
+            </a:rPr>
+            <a:t> </a:t>
+          </a:r>
+          <a:r>
+            <a:rPr lang="bg-BG" err="1">
+              <a:latin typeface="Corbel" panose="020B0503020204020204"/>
+            </a:rPr>
+            <a:t>the</a:t>
+          </a:r>
+          <a:r>
+            <a:rPr lang="bg-BG">
+              <a:latin typeface="Corbel" panose="020B0503020204020204"/>
+            </a:rPr>
+            <a:t> </a:t>
+          </a:r>
+          <a:r>
+            <a:rPr lang="bg-BG" err="1">
+              <a:latin typeface="Corbel" panose="020B0503020204020204"/>
+            </a:rPr>
+            <a:t>project</a:t>
+          </a:r>
+          <a:endParaRPr lang="en-US" err="1"/>
         </a:p>
       </dgm:t>
     </dgm:pt>
@@ -2622,12 +2684,24 @@
             <a:buNone/>
           </a:pPr>
           <a:r>
+            <a:rPr lang="bg-BG" sz="2200" kern="1200" err="1">
+              <a:latin typeface="Corbel" panose="020B0503020204020204"/>
+            </a:rPr>
+            <a:t>Our</a:t>
+          </a:r>
+          <a:r>
             <a:rPr lang="bg-BG" sz="2200" kern="1200">
               <a:latin typeface="Corbel" panose="020B0503020204020204"/>
             </a:rPr>
-            <a:t>Our team</a:t>
+            <a:t> </a:t>
           </a:r>
-          <a:endParaRPr lang="en-US" sz="2200" kern="1200"/>
+          <a:r>
+            <a:rPr lang="bg-BG" sz="2200" kern="1200" err="1">
+              <a:latin typeface="Corbel" panose="020B0503020204020204"/>
+            </a:rPr>
+            <a:t>team</a:t>
+          </a:r>
+          <a:endParaRPr lang="en-US" sz="2200" kern="1200" err="1"/>
         </a:p>
       </dsp:txBody>
       <dsp:txXfrm>
@@ -2776,12 +2850,48 @@
             <a:buNone/>
           </a:pPr>
           <a:r>
+            <a:rPr lang="bg-BG" sz="2200" kern="1200" err="1">
+              <a:latin typeface="Corbel" panose="020B0503020204020204"/>
+            </a:rPr>
+            <a:t>Idea</a:t>
+          </a:r>
+          <a:r>
             <a:rPr lang="bg-BG" sz="2200" kern="1200">
               <a:latin typeface="Corbel" panose="020B0503020204020204"/>
             </a:rPr>
-            <a:t>Idea of the project</a:t>
+            <a:t> </a:t>
           </a:r>
-          <a:endParaRPr lang="en-US" sz="2200" kern="1200"/>
+          <a:r>
+            <a:rPr lang="bg-BG" sz="2200" kern="1200" err="1">
+              <a:latin typeface="Corbel" panose="020B0503020204020204"/>
+            </a:rPr>
+            <a:t>of</a:t>
+          </a:r>
+          <a:r>
+            <a:rPr lang="bg-BG" sz="2200" kern="1200">
+              <a:latin typeface="Corbel" panose="020B0503020204020204"/>
+            </a:rPr>
+            <a:t> </a:t>
+          </a:r>
+          <a:r>
+            <a:rPr lang="bg-BG" sz="2200" kern="1200" err="1">
+              <a:latin typeface="Corbel" panose="020B0503020204020204"/>
+            </a:rPr>
+            <a:t>the</a:t>
+          </a:r>
+          <a:r>
+            <a:rPr lang="bg-BG" sz="2200" kern="1200">
+              <a:latin typeface="Corbel" panose="020B0503020204020204"/>
+            </a:rPr>
+            <a:t> </a:t>
+          </a:r>
+          <a:r>
+            <a:rPr lang="bg-BG" sz="2200" kern="1200" err="1">
+              <a:latin typeface="Corbel" panose="020B0503020204020204"/>
+            </a:rPr>
+            <a:t>project</a:t>
+          </a:r>
+          <a:endParaRPr lang="en-US" sz="2200" kern="1200" err="1"/>
         </a:p>
       </dsp:txBody>
       <dsp:txXfrm>
@@ -3084,12 +3194,24 @@
             <a:buNone/>
           </a:pPr>
           <a:r>
+            <a:rPr lang="bg-BG" sz="2200" kern="1200" err="1">
+              <a:latin typeface="Corbel" panose="020B0503020204020204"/>
+            </a:rPr>
+            <a:t>Future</a:t>
+          </a:r>
+          <a:r>
             <a:rPr lang="bg-BG" sz="2200" kern="1200">
               <a:latin typeface="Corbel" panose="020B0503020204020204"/>
             </a:rPr>
-            <a:t>Future plans</a:t>
+            <a:t> </a:t>
           </a:r>
-          <a:endParaRPr lang="en-US" sz="2200" kern="1200"/>
+          <a:r>
+            <a:rPr lang="bg-BG" sz="2200" kern="1200" err="1">
+              <a:latin typeface="Corbel" panose="020B0503020204020204"/>
+            </a:rPr>
+            <a:t>plans</a:t>
+          </a:r>
+          <a:endParaRPr lang="en-US" sz="2200" kern="1200" err="1"/>
         </a:p>
       </dsp:txBody>
       <dsp:txXfrm>
@@ -6030,7 +6152,7 @@
           </a:lstStyle>
           <a:p>
             <a:r>
-              <a:rPr lang="en-US" dirty="0"/>
+              <a:rPr lang="en-US"/>
               <a:t>Click to edit Master title style</a:t>
             </a:r>
           </a:p>
@@ -6103,7 +6225,7 @@
           </a:lstStyle>
           <a:p>
             <a:r>
-              <a:rPr lang="en-US" dirty="0"/>
+              <a:rPr lang="en-US"/>
               <a:t>Click to edit Master subtitle style</a:t>
             </a:r>
           </a:p>
@@ -6127,9 +6249,9 @@
             <a:fld id="{5586B75A-687E-405C-8A0B-8D00578BA2C3}" type="datetimeFigureOut">
               <a:rPr lang="en-US" dirty="0"/>
               <a:pPr/>
-              <a:t>6/10/2020</a:t>
+              <a:t>6/12/2020</a:t>
             </a:fld>
-            <a:endParaRPr lang="en-US" dirty="0"/>
+            <a:endParaRPr lang="en-US"/>
           </a:p>
         </p:txBody>
       </p:sp>
@@ -6148,7 +6270,7 @@
           <a:bodyPr/>
           <a:lstStyle/>
           <a:p>
-            <a:endParaRPr lang="en-US" dirty="0"/>
+            <a:endParaRPr lang="en-US"/>
           </a:p>
         </p:txBody>
       </p:sp>
@@ -6172,7 +6294,7 @@
               <a:pPr/>
               <a:t>‹#›</a:t>
             </a:fld>
-            <a:endParaRPr lang="en-US" dirty="0"/>
+            <a:endParaRPr lang="en-US"/>
           </a:p>
         </p:txBody>
       </p:sp>
@@ -6222,7 +6344,7 @@
           <a:lstStyle/>
           <a:p>
             <a:r>
-              <a:rPr lang="en-US" dirty="0"/>
+              <a:rPr lang="en-US"/>
               <a:t>Click to edit Master title style</a:t>
             </a:r>
           </a:p>
@@ -6245,35 +6367,35 @@
           <a:p>
             <a:pPr lvl="0"/>
             <a:r>
-              <a:rPr lang="en-US" dirty="0"/>
+              <a:rPr lang="en-US"/>
               <a:t>Click to edit Master text styles</a:t>
             </a:r>
           </a:p>
           <a:p>
             <a:pPr lvl="1"/>
             <a:r>
-              <a:rPr lang="en-US" dirty="0"/>
+              <a:rPr lang="en-US"/>
               <a:t>Second level</a:t>
             </a:r>
           </a:p>
           <a:p>
             <a:pPr lvl="2"/>
             <a:r>
-              <a:rPr lang="en-US" dirty="0"/>
+              <a:rPr lang="en-US"/>
               <a:t>Third level</a:t>
             </a:r>
           </a:p>
           <a:p>
             <a:pPr lvl="3"/>
             <a:r>
-              <a:rPr lang="en-US" dirty="0"/>
+              <a:rPr lang="en-US"/>
               <a:t>Fourth level</a:t>
             </a:r>
           </a:p>
           <a:p>
             <a:pPr lvl="4"/>
             <a:r>
-              <a:rPr lang="en-US" dirty="0"/>
+              <a:rPr lang="en-US"/>
               <a:t>Fifth level</a:t>
             </a:r>
           </a:p>
@@ -6297,9 +6419,9 @@
             <a:fld id="{5586B75A-687E-405C-8A0B-8D00578BA2C3}" type="datetimeFigureOut">
               <a:rPr lang="en-US" dirty="0"/>
               <a:pPr/>
-              <a:t>6/10/2020</a:t>
+              <a:t>6/12/2020</a:t>
             </a:fld>
-            <a:endParaRPr lang="en-US" dirty="0"/>
+            <a:endParaRPr lang="en-US"/>
           </a:p>
         </p:txBody>
       </p:sp>
@@ -6318,7 +6440,7 @@
           <a:bodyPr/>
           <a:lstStyle/>
           <a:p>
-            <a:endParaRPr lang="en-US" dirty="0"/>
+            <a:endParaRPr lang="en-US"/>
           </a:p>
         </p:txBody>
       </p:sp>
@@ -6342,7 +6464,7 @@
               <a:pPr/>
               <a:t>‹#›</a:t>
             </a:fld>
-            <a:endParaRPr lang="en-US" dirty="0"/>
+            <a:endParaRPr lang="en-US"/>
           </a:p>
         </p:txBody>
       </p:sp>
@@ -6397,7 +6519,7 @@
           <a:lstStyle/>
           <a:p>
             <a:r>
-              <a:rPr lang="en-US" dirty="0"/>
+              <a:rPr lang="en-US"/>
               <a:t>Click to edit Master title style</a:t>
             </a:r>
           </a:p>
@@ -6425,35 +6547,35 @@
           <a:p>
             <a:pPr lvl="0"/>
             <a:r>
-              <a:rPr lang="en-US" dirty="0"/>
+              <a:rPr lang="en-US"/>
               <a:t>Click to edit Master text styles</a:t>
             </a:r>
           </a:p>
           <a:p>
             <a:pPr lvl="1"/>
             <a:r>
-              <a:rPr lang="en-US" dirty="0"/>
+              <a:rPr lang="en-US"/>
               <a:t>Second level</a:t>
             </a:r>
           </a:p>
           <a:p>
             <a:pPr lvl="2"/>
             <a:r>
-              <a:rPr lang="en-US" dirty="0"/>
+              <a:rPr lang="en-US"/>
               <a:t>Third level</a:t>
             </a:r>
           </a:p>
           <a:p>
             <a:pPr lvl="3"/>
             <a:r>
-              <a:rPr lang="en-US" dirty="0"/>
+              <a:rPr lang="en-US"/>
               <a:t>Fourth level</a:t>
             </a:r>
           </a:p>
           <a:p>
             <a:pPr lvl="4"/>
             <a:r>
-              <a:rPr lang="en-US" dirty="0"/>
+              <a:rPr lang="en-US"/>
               <a:t>Fifth level</a:t>
             </a:r>
           </a:p>
@@ -6477,9 +6599,9 @@
             <a:fld id="{5586B75A-687E-405C-8A0B-8D00578BA2C3}" type="datetimeFigureOut">
               <a:rPr lang="en-US" dirty="0"/>
               <a:pPr/>
-              <a:t>6/10/2020</a:t>
+              <a:t>6/12/2020</a:t>
             </a:fld>
-            <a:endParaRPr lang="en-US" dirty="0"/>
+            <a:endParaRPr lang="en-US"/>
           </a:p>
         </p:txBody>
       </p:sp>
@@ -6498,7 +6620,7 @@
           <a:bodyPr/>
           <a:lstStyle/>
           <a:p>
-            <a:endParaRPr lang="en-US" dirty="0"/>
+            <a:endParaRPr lang="en-US"/>
           </a:p>
         </p:txBody>
       </p:sp>
@@ -6522,7 +6644,7 @@
               <a:pPr/>
               <a:t>‹#›</a:t>
             </a:fld>
-            <a:endParaRPr lang="en-US" dirty="0"/>
+            <a:endParaRPr lang="en-US"/>
           </a:p>
         </p:txBody>
       </p:sp>
@@ -6761,7 +6883,7 @@
           <a:p>
             <a:fld id="{846CE7D5-CF57-46EF-B807-FDD0502418D4}" type="datetimeFigureOut">
               <a:rPr lang="en-US" smtClean="0"/>
-              <a:t>6/10/2020</a:t>
+              <a:t>6/12/2020</a:t>
             </a:fld>
             <a:endParaRPr lang="en-US"/>
           </a:p>
@@ -6929,7 +7051,7 @@
           <a:p>
             <a:fld id="{846CE7D5-CF57-46EF-B807-FDD0502418D4}" type="datetimeFigureOut">
               <a:rPr lang="en-US" smtClean="0"/>
-              <a:t>6/10/2020</a:t>
+              <a:t>6/12/2020</a:t>
             </a:fld>
             <a:endParaRPr lang="en-US"/>
           </a:p>
@@ -7186,7 +7308,7 @@
           <a:p>
             <a:fld id="{846CE7D5-CF57-46EF-B807-FDD0502418D4}" type="datetimeFigureOut">
               <a:rPr lang="en-US" smtClean="0"/>
-              <a:t>6/10/2020</a:t>
+              <a:t>6/12/2020</a:t>
             </a:fld>
             <a:endParaRPr lang="en-US"/>
           </a:p>
@@ -7471,7 +7593,7 @@
           <a:p>
             <a:fld id="{846CE7D5-CF57-46EF-B807-FDD0502418D4}" type="datetimeFigureOut">
               <a:rPr lang="en-US" smtClean="0"/>
-              <a:t>6/10/2020</a:t>
+              <a:t>6/12/2020</a:t>
             </a:fld>
             <a:endParaRPr lang="en-US"/>
           </a:p>
@@ -7910,7 +8032,7 @@
           <a:p>
             <a:fld id="{846CE7D5-CF57-46EF-B807-FDD0502418D4}" type="datetimeFigureOut">
               <a:rPr lang="en-US" smtClean="0"/>
-              <a:t>6/10/2020</a:t>
+              <a:t>6/12/2020</a:t>
             </a:fld>
             <a:endParaRPr lang="en-US"/>
           </a:p>
@@ -8027,7 +8149,7 @@
           <a:p>
             <a:fld id="{846CE7D5-CF57-46EF-B807-FDD0502418D4}" type="datetimeFigureOut">
               <a:rPr lang="en-US" smtClean="0"/>
-              <a:t>6/10/2020</a:t>
+              <a:t>6/12/2020</a:t>
             </a:fld>
             <a:endParaRPr lang="en-US"/>
           </a:p>
@@ -8122,7 +8244,7 @@
           <a:p>
             <a:fld id="{846CE7D5-CF57-46EF-B807-FDD0502418D4}" type="datetimeFigureOut">
               <a:rPr lang="en-US" smtClean="0"/>
-              <a:t>6/10/2020</a:t>
+              <a:t>6/12/2020</a:t>
             </a:fld>
             <a:endParaRPr lang="en-US"/>
           </a:p>
@@ -8408,7 +8530,7 @@
           <a:p>
             <a:fld id="{846CE7D5-CF57-46EF-B807-FDD0502418D4}" type="datetimeFigureOut">
               <a:rPr lang="en-US" smtClean="0"/>
-              <a:t>6/10/2020</a:t>
+              <a:t>6/12/2020</a:t>
             </a:fld>
             <a:endParaRPr lang="en-US"/>
           </a:p>
@@ -8502,7 +8624,7 @@
           <a:lstStyle/>
           <a:p>
             <a:r>
-              <a:rPr lang="en-US" dirty="0"/>
+              <a:rPr lang="en-US"/>
               <a:t>Click to edit Master title style</a:t>
             </a:r>
           </a:p>
@@ -8525,35 +8647,35 @@
           <a:p>
             <a:pPr lvl="0"/>
             <a:r>
-              <a:rPr lang="en-US" dirty="0"/>
+              <a:rPr lang="en-US"/>
               <a:t>Click to edit Master text styles</a:t>
             </a:r>
           </a:p>
           <a:p>
             <a:pPr lvl="1"/>
             <a:r>
-              <a:rPr lang="en-US" dirty="0"/>
+              <a:rPr lang="en-US"/>
               <a:t>Second level</a:t>
             </a:r>
           </a:p>
           <a:p>
             <a:pPr lvl="2"/>
             <a:r>
-              <a:rPr lang="en-US" dirty="0"/>
+              <a:rPr lang="en-US"/>
               <a:t>Third level</a:t>
             </a:r>
           </a:p>
           <a:p>
             <a:pPr lvl="3"/>
             <a:r>
-              <a:rPr lang="en-US" dirty="0"/>
+              <a:rPr lang="en-US"/>
               <a:t>Fourth level</a:t>
             </a:r>
           </a:p>
           <a:p>
             <a:pPr lvl="4"/>
             <a:r>
-              <a:rPr lang="en-US" dirty="0"/>
+              <a:rPr lang="en-US"/>
               <a:t>Fifth level</a:t>
             </a:r>
           </a:p>
@@ -8577,9 +8699,9 @@
             <a:fld id="{5586B75A-687E-405C-8A0B-8D00578BA2C3}" type="datetimeFigureOut">
               <a:rPr lang="en-US" dirty="0"/>
               <a:pPr/>
-              <a:t>6/10/2020</a:t>
+              <a:t>6/12/2020</a:t>
             </a:fld>
-            <a:endParaRPr lang="en-US" dirty="0"/>
+            <a:endParaRPr lang="en-US"/>
           </a:p>
         </p:txBody>
       </p:sp>
@@ -8598,7 +8720,7 @@
           <a:bodyPr/>
           <a:lstStyle/>
           <a:p>
-            <a:endParaRPr lang="en-US" dirty="0"/>
+            <a:endParaRPr lang="en-US"/>
           </a:p>
         </p:txBody>
       </p:sp>
@@ -8622,7 +8744,7 @@
               <a:pPr/>
               <a:t>‹#›</a:t>
             </a:fld>
-            <a:endParaRPr lang="en-US" dirty="0"/>
+            <a:endParaRPr lang="en-US"/>
           </a:p>
         </p:txBody>
       </p:sp>
@@ -8849,7 +8971,7 @@
           <a:p>
             <a:fld id="{846CE7D5-CF57-46EF-B807-FDD0502418D4}" type="datetimeFigureOut">
               <a:rPr lang="en-US" smtClean="0"/>
-              <a:t>6/10/2020</a:t>
+              <a:t>6/12/2020</a:t>
             </a:fld>
             <a:endParaRPr lang="en-US"/>
           </a:p>
@@ -9022,7 +9144,7 @@
           <a:p>
             <a:fld id="{846CE7D5-CF57-46EF-B807-FDD0502418D4}" type="datetimeFigureOut">
               <a:rPr lang="en-US" smtClean="0"/>
-              <a:t>6/10/2020</a:t>
+              <a:t>6/12/2020</a:t>
             </a:fld>
             <a:endParaRPr lang="en-US"/>
           </a:p>
@@ -9200,7 +9322,7 @@
           <a:p>
             <a:fld id="{846CE7D5-CF57-46EF-B807-FDD0502418D4}" type="datetimeFigureOut">
               <a:rPr lang="en-US" smtClean="0"/>
-              <a:t>6/10/2020</a:t>
+              <a:t>6/12/2020</a:t>
             </a:fld>
             <a:endParaRPr lang="en-US"/>
           </a:p>
@@ -9312,7 +9434,7 @@
           </a:lstStyle>
           <a:p>
             <a:r>
-              <a:rPr lang="en-US" dirty="0"/>
+              <a:rPr lang="en-US"/>
               <a:t>Click to edit Master title style</a:t>
             </a:r>
           </a:p>
@@ -9434,7 +9556,7 @@
           <a:p>
             <a:pPr lvl="0"/>
             <a:r>
-              <a:rPr lang="en-US" dirty="0"/>
+              <a:rPr lang="en-US"/>
               <a:t>Click to edit Master text styles</a:t>
             </a:r>
           </a:p>
@@ -9458,9 +9580,9 @@
             <a:fld id="{5586B75A-687E-405C-8A0B-8D00578BA2C3}" type="datetimeFigureOut">
               <a:rPr lang="en-US" dirty="0"/>
               <a:pPr/>
-              <a:t>6/10/2020</a:t>
+              <a:t>6/12/2020</a:t>
             </a:fld>
-            <a:endParaRPr lang="en-US" dirty="0"/>
+            <a:endParaRPr lang="en-US"/>
           </a:p>
         </p:txBody>
       </p:sp>
@@ -9479,7 +9601,7 @@
           <a:bodyPr/>
           <a:lstStyle/>
           <a:p>
-            <a:endParaRPr lang="en-US" dirty="0"/>
+            <a:endParaRPr lang="en-US"/>
           </a:p>
         </p:txBody>
       </p:sp>
@@ -9503,7 +9625,7 @@
               <a:pPr/>
               <a:t>‹#›</a:t>
             </a:fld>
-            <a:endParaRPr lang="en-US" dirty="0"/>
+            <a:endParaRPr lang="en-US"/>
           </a:p>
         </p:txBody>
       </p:sp>
@@ -9553,7 +9675,7 @@
           <a:lstStyle/>
           <a:p>
             <a:r>
-              <a:rPr lang="en-US" dirty="0"/>
+              <a:rPr lang="en-US"/>
               <a:t>Click to edit Master title style</a:t>
             </a:r>
           </a:p>
@@ -9609,35 +9731,35 @@
           <a:p>
             <a:pPr lvl="0"/>
             <a:r>
-              <a:rPr lang="en-US" dirty="0"/>
+              <a:rPr lang="en-US"/>
               <a:t>Click to edit Master text styles</a:t>
             </a:r>
           </a:p>
           <a:p>
             <a:pPr lvl="1"/>
             <a:r>
-              <a:rPr lang="en-US" dirty="0"/>
+              <a:rPr lang="en-US"/>
               <a:t>Second level</a:t>
             </a:r>
           </a:p>
           <a:p>
             <a:pPr lvl="2"/>
             <a:r>
-              <a:rPr lang="en-US" dirty="0"/>
+              <a:rPr lang="en-US"/>
               <a:t>Third level</a:t>
             </a:r>
           </a:p>
           <a:p>
             <a:pPr lvl="3"/>
             <a:r>
-              <a:rPr lang="en-US" dirty="0"/>
+              <a:rPr lang="en-US"/>
               <a:t>Fourth level</a:t>
             </a:r>
           </a:p>
           <a:p>
             <a:pPr lvl="4"/>
             <a:r>
-              <a:rPr lang="en-US" dirty="0"/>
+              <a:rPr lang="en-US"/>
               <a:t>Fifth level</a:t>
             </a:r>
           </a:p>
@@ -9693,35 +9815,35 @@
           <a:p>
             <a:pPr lvl="0"/>
             <a:r>
-              <a:rPr lang="en-US" dirty="0"/>
+              <a:rPr lang="en-US"/>
               <a:t>Click to edit Master text styles</a:t>
             </a:r>
           </a:p>
           <a:p>
             <a:pPr lvl="1"/>
             <a:r>
-              <a:rPr lang="en-US" dirty="0"/>
+              <a:rPr lang="en-US"/>
               <a:t>Second level</a:t>
             </a:r>
           </a:p>
           <a:p>
             <a:pPr lvl="2"/>
             <a:r>
-              <a:rPr lang="en-US" dirty="0"/>
+              <a:rPr lang="en-US"/>
               <a:t>Third level</a:t>
             </a:r>
           </a:p>
           <a:p>
             <a:pPr lvl="3"/>
             <a:r>
-              <a:rPr lang="en-US" dirty="0"/>
+              <a:rPr lang="en-US"/>
               <a:t>Fourth level</a:t>
             </a:r>
           </a:p>
           <a:p>
             <a:pPr lvl="4"/>
             <a:r>
-              <a:rPr lang="en-US" dirty="0"/>
+              <a:rPr lang="en-US"/>
               <a:t>Fifth level</a:t>
             </a:r>
           </a:p>
@@ -9745,9 +9867,9 @@
             <a:fld id="{5586B75A-687E-405C-8A0B-8D00578BA2C3}" type="datetimeFigureOut">
               <a:rPr lang="en-US" dirty="0"/>
               <a:pPr/>
-              <a:t>6/10/2020</a:t>
+              <a:t>6/12/2020</a:t>
             </a:fld>
-            <a:endParaRPr lang="en-US" dirty="0"/>
+            <a:endParaRPr lang="en-US"/>
           </a:p>
         </p:txBody>
       </p:sp>
@@ -9766,7 +9888,7 @@
           <a:bodyPr/>
           <a:lstStyle/>
           <a:p>
-            <a:endParaRPr lang="en-US" dirty="0"/>
+            <a:endParaRPr lang="en-US"/>
           </a:p>
         </p:txBody>
       </p:sp>
@@ -9790,7 +9912,7 @@
               <a:pPr/>
               <a:t>‹#›</a:t>
             </a:fld>
-            <a:endParaRPr lang="en-US" dirty="0"/>
+            <a:endParaRPr lang="en-US"/>
           </a:p>
         </p:txBody>
       </p:sp>
@@ -9840,7 +9962,7 @@
           <a:lstStyle/>
           <a:p>
             <a:r>
-              <a:rPr lang="en-US" dirty="0"/>
+              <a:rPr lang="en-US"/>
               <a:t>Click to edit Master title style</a:t>
             </a:r>
           </a:p>
@@ -9917,7 +10039,7 @@
           <a:p>
             <a:pPr lvl="0"/>
             <a:r>
-              <a:rPr lang="en-US" dirty="0"/>
+              <a:rPr lang="en-US"/>
               <a:t>Click to edit Master text styles</a:t>
             </a:r>
           </a:p>
@@ -9973,35 +10095,35 @@
           <a:p>
             <a:pPr lvl="0"/>
             <a:r>
-              <a:rPr lang="en-US" dirty="0"/>
+              <a:rPr lang="en-US"/>
               <a:t>Click to edit Master text styles</a:t>
             </a:r>
           </a:p>
           <a:p>
             <a:pPr lvl="1"/>
             <a:r>
-              <a:rPr lang="en-US" dirty="0"/>
+              <a:rPr lang="en-US"/>
               <a:t>Second level</a:t>
             </a:r>
           </a:p>
           <a:p>
             <a:pPr lvl="2"/>
             <a:r>
-              <a:rPr lang="en-US" dirty="0"/>
+              <a:rPr lang="en-US"/>
               <a:t>Third level</a:t>
             </a:r>
           </a:p>
           <a:p>
             <a:pPr lvl="3"/>
             <a:r>
-              <a:rPr lang="en-US" dirty="0"/>
+              <a:rPr lang="en-US"/>
               <a:t>Fourth level</a:t>
             </a:r>
           </a:p>
           <a:p>
             <a:pPr lvl="4"/>
             <a:r>
-              <a:rPr lang="en-US" dirty="0"/>
+              <a:rPr lang="en-US"/>
               <a:t>Fifth level</a:t>
             </a:r>
           </a:p>
@@ -10078,7 +10200,7 @@
           <a:p>
             <a:pPr lvl="0"/>
             <a:r>
-              <a:rPr lang="en-US" dirty="0"/>
+              <a:rPr lang="en-US"/>
               <a:t>Click to edit Master text styles</a:t>
             </a:r>
           </a:p>
@@ -10134,35 +10256,35 @@
           <a:p>
             <a:pPr lvl="0"/>
             <a:r>
-              <a:rPr lang="en-US" dirty="0"/>
+              <a:rPr lang="en-US"/>
               <a:t>Click to edit Master text styles</a:t>
             </a:r>
           </a:p>
           <a:p>
             <a:pPr lvl="1"/>
             <a:r>
-              <a:rPr lang="en-US" dirty="0"/>
+              <a:rPr lang="en-US"/>
               <a:t>Second level</a:t>
             </a:r>
           </a:p>
           <a:p>
             <a:pPr lvl="2"/>
             <a:r>
-              <a:rPr lang="en-US" dirty="0"/>
+              <a:rPr lang="en-US"/>
               <a:t>Third level</a:t>
             </a:r>
           </a:p>
           <a:p>
             <a:pPr lvl="3"/>
             <a:r>
-              <a:rPr lang="en-US" dirty="0"/>
+              <a:rPr lang="en-US"/>
               <a:t>Fourth level</a:t>
             </a:r>
           </a:p>
           <a:p>
             <a:pPr lvl="4"/>
             <a:r>
-              <a:rPr lang="en-US" dirty="0"/>
+              <a:rPr lang="en-US"/>
               <a:t>Fifth level</a:t>
             </a:r>
           </a:p>
@@ -10186,9 +10308,9 @@
             <a:fld id="{5586B75A-687E-405C-8A0B-8D00578BA2C3}" type="datetimeFigureOut">
               <a:rPr lang="en-US" dirty="0"/>
               <a:pPr/>
-              <a:t>6/10/2020</a:t>
+              <a:t>6/12/2020</a:t>
             </a:fld>
-            <a:endParaRPr lang="en-US" dirty="0"/>
+            <a:endParaRPr lang="en-US"/>
           </a:p>
         </p:txBody>
       </p:sp>
@@ -10207,7 +10329,7 @@
           <a:bodyPr/>
           <a:lstStyle/>
           <a:p>
-            <a:endParaRPr lang="en-US" dirty="0"/>
+            <a:endParaRPr lang="en-US"/>
           </a:p>
         </p:txBody>
       </p:sp>
@@ -10231,7 +10353,7 @@
               <a:pPr/>
               <a:t>‹#›</a:t>
             </a:fld>
-            <a:endParaRPr lang="en-US" dirty="0"/>
+            <a:endParaRPr lang="en-US"/>
           </a:p>
         </p:txBody>
       </p:sp>
@@ -10281,7 +10403,7 @@
           <a:lstStyle/>
           <a:p>
             <a:r>
-              <a:rPr lang="en-US" dirty="0"/>
+              <a:rPr lang="en-US"/>
               <a:t>Click to edit Master title style</a:t>
             </a:r>
           </a:p>
@@ -10305,9 +10427,9 @@
             <a:fld id="{5586B75A-687E-405C-8A0B-8D00578BA2C3}" type="datetimeFigureOut">
               <a:rPr lang="en-US" dirty="0"/>
               <a:pPr/>
-              <a:t>6/10/2020</a:t>
+              <a:t>6/12/2020</a:t>
             </a:fld>
-            <a:endParaRPr lang="en-US" dirty="0"/>
+            <a:endParaRPr lang="en-US"/>
           </a:p>
         </p:txBody>
       </p:sp>
@@ -10326,7 +10448,7 @@
           <a:bodyPr/>
           <a:lstStyle/>
           <a:p>
-            <a:endParaRPr lang="en-US" dirty="0"/>
+            <a:endParaRPr lang="en-US"/>
           </a:p>
         </p:txBody>
       </p:sp>
@@ -10350,7 +10472,7 @@
               <a:pPr/>
               <a:t>‹#›</a:t>
             </a:fld>
-            <a:endParaRPr lang="en-US" dirty="0"/>
+            <a:endParaRPr lang="en-US"/>
           </a:p>
         </p:txBody>
       </p:sp>
@@ -10402,9 +10524,9 @@
             <a:fld id="{5586B75A-687E-405C-8A0B-8D00578BA2C3}" type="datetimeFigureOut">
               <a:rPr lang="en-US" dirty="0"/>
               <a:pPr/>
-              <a:t>6/10/2020</a:t>
+              <a:t>6/12/2020</a:t>
             </a:fld>
-            <a:endParaRPr lang="en-US" dirty="0"/>
+            <a:endParaRPr lang="en-US"/>
           </a:p>
         </p:txBody>
       </p:sp>
@@ -10423,7 +10545,7 @@
           <a:bodyPr/>
           <a:lstStyle/>
           <a:p>
-            <a:endParaRPr lang="en-US" dirty="0"/>
+            <a:endParaRPr lang="en-US"/>
           </a:p>
         </p:txBody>
       </p:sp>
@@ -10447,7 +10569,7 @@
               <a:pPr/>
               <a:t>‹#›</a:t>
             </a:fld>
-            <a:endParaRPr lang="en-US" dirty="0"/>
+            <a:endParaRPr lang="en-US"/>
           </a:p>
         </p:txBody>
       </p:sp>
@@ -10508,7 +10630,7 @@
           </a:lstStyle>
           <a:p>
             <a:r>
-              <a:rPr lang="en-US" dirty="0"/>
+              <a:rPr lang="en-US"/>
               <a:t>Click to edit Master title style</a:t>
             </a:r>
           </a:p>
@@ -10564,35 +10686,35 @@
           <a:p>
             <a:pPr lvl="0"/>
             <a:r>
-              <a:rPr lang="en-US" dirty="0"/>
+              <a:rPr lang="en-US"/>
               <a:t>Click to edit Master text styles</a:t>
             </a:r>
           </a:p>
           <a:p>
             <a:pPr lvl="1"/>
             <a:r>
-              <a:rPr lang="en-US" dirty="0"/>
+              <a:rPr lang="en-US"/>
               <a:t>Second level</a:t>
             </a:r>
           </a:p>
           <a:p>
             <a:pPr lvl="2"/>
             <a:r>
-              <a:rPr lang="en-US" dirty="0"/>
+              <a:rPr lang="en-US"/>
               <a:t>Third level</a:t>
             </a:r>
           </a:p>
           <a:p>
             <a:pPr lvl="3"/>
             <a:r>
-              <a:rPr lang="en-US" dirty="0"/>
+              <a:rPr lang="en-US"/>
               <a:t>Fourth level</a:t>
             </a:r>
           </a:p>
           <a:p>
             <a:pPr lvl="4"/>
             <a:r>
-              <a:rPr lang="en-US" dirty="0"/>
+              <a:rPr lang="en-US"/>
               <a:t>Fifth level</a:t>
             </a:r>
           </a:p>
@@ -10666,7 +10788,7 @@
           <a:p>
             <a:pPr lvl="0"/>
             <a:r>
-              <a:rPr lang="en-US" dirty="0"/>
+              <a:rPr lang="en-US"/>
               <a:t>Click to edit Master text styles</a:t>
             </a:r>
           </a:p>
@@ -10690,9 +10812,9 @@
             <a:fld id="{5586B75A-687E-405C-8A0B-8D00578BA2C3}" type="datetimeFigureOut">
               <a:rPr lang="en-US" dirty="0"/>
               <a:pPr/>
-              <a:t>6/10/2020</a:t>
+              <a:t>6/12/2020</a:t>
             </a:fld>
-            <a:endParaRPr lang="en-US" dirty="0"/>
+            <a:endParaRPr lang="en-US"/>
           </a:p>
         </p:txBody>
       </p:sp>
@@ -10711,7 +10833,7 @@
           <a:bodyPr/>
           <a:lstStyle/>
           <a:p>
-            <a:endParaRPr lang="en-US" dirty="0"/>
+            <a:endParaRPr lang="en-US"/>
           </a:p>
         </p:txBody>
       </p:sp>
@@ -10735,7 +10857,7 @@
               <a:pPr/>
               <a:t>‹#›</a:t>
             </a:fld>
-            <a:endParaRPr lang="en-US" dirty="0"/>
+            <a:endParaRPr lang="en-US"/>
           </a:p>
         </p:txBody>
       </p:sp>
@@ -10796,7 +10918,7 @@
           </a:lstStyle>
           <a:p>
             <a:r>
-              <a:rPr lang="en-US" dirty="0"/>
+              <a:rPr lang="en-US"/>
               <a:t>Click to edit Master title style</a:t>
             </a:r>
           </a:p>
@@ -10864,7 +10986,7 @@
             </a:lvl9pPr>
           </a:lstStyle>
           <a:p>
-            <a:endParaRPr lang="en-US" dirty="0"/>
+            <a:endParaRPr lang="en-US"/>
           </a:p>
         </p:txBody>
       </p:sp>
@@ -10936,7 +11058,7 @@
           <a:p>
             <a:pPr lvl="0"/>
             <a:r>
-              <a:rPr lang="en-US" dirty="0"/>
+              <a:rPr lang="en-US"/>
               <a:t>Click to edit Master text styles</a:t>
             </a:r>
           </a:p>
@@ -10960,9 +11082,9 @@
             <a:fld id="{5586B75A-687E-405C-8A0B-8D00578BA2C3}" type="datetimeFigureOut">
               <a:rPr lang="en-US" dirty="0"/>
               <a:pPr/>
-              <a:t>6/10/2020</a:t>
+              <a:t>6/12/2020</a:t>
             </a:fld>
-            <a:endParaRPr lang="en-US" dirty="0"/>
+            <a:endParaRPr lang="en-US"/>
           </a:p>
         </p:txBody>
       </p:sp>
@@ -10986,7 +11108,7 @@
           <a:bodyPr/>
           <a:lstStyle/>
           <a:p>
-            <a:endParaRPr lang="en-US" dirty="0"/>
+            <a:endParaRPr lang="en-US"/>
           </a:p>
         </p:txBody>
       </p:sp>
@@ -11010,7 +11132,7 @@
               <a:pPr/>
               <a:t>‹#›</a:t>
             </a:fld>
-            <a:endParaRPr lang="en-US" dirty="0"/>
+            <a:endParaRPr lang="en-US"/>
           </a:p>
         </p:txBody>
       </p:sp>
@@ -11113,7 +11235,7 @@
           <a:lstStyle/>
           <a:p>
             <a:r>
-              <a:rPr lang="en-US" dirty="0"/>
+              <a:rPr lang="en-US"/>
               <a:t>Click to edit Master title style</a:t>
             </a:r>
           </a:p>
@@ -11186,35 +11308,35 @@
           <a:p>
             <a:pPr lvl="0"/>
             <a:r>
-              <a:rPr lang="en-US" dirty="0"/>
+              <a:rPr lang="en-US"/>
               <a:t>Click to edit Master text styles</a:t>
             </a:r>
           </a:p>
           <a:p>
             <a:pPr lvl="1"/>
             <a:r>
-              <a:rPr lang="en-US" dirty="0"/>
+              <a:rPr lang="en-US"/>
               <a:t>Second level</a:t>
             </a:r>
           </a:p>
           <a:p>
             <a:pPr lvl="2"/>
             <a:r>
-              <a:rPr lang="en-US" dirty="0"/>
+              <a:rPr lang="en-US"/>
               <a:t>Third level</a:t>
             </a:r>
           </a:p>
           <a:p>
             <a:pPr lvl="3"/>
             <a:r>
-              <a:rPr lang="en-US" dirty="0"/>
+              <a:rPr lang="en-US"/>
               <a:t>Fourth level</a:t>
             </a:r>
           </a:p>
           <a:p>
             <a:pPr lvl="4"/>
             <a:r>
-              <a:rPr lang="en-US" dirty="0"/>
+              <a:rPr lang="en-US"/>
               <a:t>Fifth level</a:t>
             </a:r>
           </a:p>
@@ -11257,9 +11379,9 @@
             <a:fld id="{5586B75A-687E-405C-8A0B-8D00578BA2C3}" type="datetimeFigureOut">
               <a:rPr lang="en-US" dirty="0"/>
               <a:pPr/>
-              <a:t>6/10/2020</a:t>
+              <a:t>6/12/2020</a:t>
             </a:fld>
-            <a:endParaRPr lang="en-US" dirty="0"/>
+            <a:endParaRPr lang="en-US"/>
           </a:p>
         </p:txBody>
       </p:sp>
@@ -11297,7 +11419,7 @@
             </a:lvl1pPr>
           </a:lstStyle>
           <a:p>
-            <a:endParaRPr lang="en-US" dirty="0"/>
+            <a:endParaRPr lang="en-US"/>
           </a:p>
         </p:txBody>
       </p:sp>
@@ -11337,7 +11459,7 @@
               <a:pPr/>
               <a:t>‹#›</a:t>
             </a:fld>
-            <a:endParaRPr lang="en-US" dirty="0"/>
+            <a:endParaRPr lang="en-US"/>
           </a:p>
         </p:txBody>
       </p:sp>
@@ -11953,7 +12075,7 @@
           <a:p>
             <a:fld id="{846CE7D5-CF57-46EF-B807-FDD0502418D4}" type="datetimeFigureOut">
               <a:rPr lang="en-US" smtClean="0"/>
-              <a:t>6/10/2020</a:t>
+              <a:t>6/12/2020</a:t>
             </a:fld>
             <a:endParaRPr lang="en-US"/>
           </a:p>
@@ -12499,7 +12621,7 @@
           <a:lstStyle/>
           <a:p>
             <a:pPr algn="ctr"/>
-            <a:endParaRPr lang="en-US" dirty="0"/>
+            <a:endParaRPr lang="en-US"/>
           </a:p>
         </p:txBody>
       </p:sp>
@@ -12646,12 +12768,12 @@
           <a:lstStyle/>
           <a:p>
             <a:r>
-              <a:rPr lang="en-US" sz="8000" dirty="0">
+              <a:rPr lang="en-US" sz="8000">
                 <a:cs typeface="Calibri Light"/>
               </a:rPr>
               <a:t>C++ string project</a:t>
             </a:r>
-            <a:endParaRPr lang="en-US" sz="8000" dirty="0"/>
+            <a:endParaRPr lang="en-US" sz="8000"/>
           </a:p>
         </p:txBody>
       </p:sp>
@@ -12733,7 +12855,7 @@
           <a:lstStyle/>
           <a:p>
             <a:r>
-              <a:rPr lang="en" sz="4400" dirty="0">
+              <a:rPr lang="en" sz="4400">
                 <a:solidFill>
                   <a:schemeClr val="bg1"/>
                 </a:solidFill>
@@ -12742,7 +12864,7 @@
               <a:t>Prepared by: Stanislav Todorov, Todor </a:t>
             </a:r>
             <a:r>
-              <a:rPr lang="en" sz="4400" dirty="0" err="1">
+              <a:rPr lang="en" sz="4400" err="1">
                 <a:solidFill>
                   <a:schemeClr val="bg1"/>
                 </a:solidFill>
@@ -12751,7 +12873,7 @@
               <a:t>Bojinov</a:t>
             </a:r>
             <a:r>
-              <a:rPr lang="en" sz="4400" dirty="0">
+              <a:rPr lang="en" sz="4400">
                 <a:solidFill>
                   <a:schemeClr val="bg1"/>
                 </a:solidFill>
@@ -12760,7 +12882,7 @@
               <a:t>, Borislav </a:t>
             </a:r>
             <a:r>
-              <a:rPr lang="en" sz="4400" dirty="0" err="1">
+              <a:rPr lang="en" sz="4400" err="1">
                 <a:solidFill>
                   <a:schemeClr val="bg1"/>
                 </a:solidFill>
@@ -12769,7 +12891,7 @@
               <a:t>Ferdinandov</a:t>
             </a:r>
             <a:r>
-              <a:rPr lang="en" sz="4400" dirty="0">
+              <a:rPr lang="en" sz="4400">
                 <a:solidFill>
                   <a:schemeClr val="bg1"/>
                 </a:solidFill>
@@ -12778,7 +12900,7 @@
               <a:t>, </a:t>
             </a:r>
             <a:r>
-              <a:rPr lang="en" sz="4400" dirty="0" err="1">
+              <a:rPr lang="en" sz="4400" err="1">
                 <a:solidFill>
                   <a:schemeClr val="bg1"/>
                 </a:solidFill>
@@ -12787,7 +12909,7 @@
               <a:t>Petar</a:t>
             </a:r>
             <a:r>
-              <a:rPr lang="en" sz="4400" dirty="0">
+              <a:rPr lang="en" sz="4400">
                 <a:solidFill>
                   <a:schemeClr val="bg1"/>
                 </a:solidFill>
@@ -12796,7 +12918,7 @@
               <a:t> </a:t>
             </a:r>
             <a:r>
-              <a:rPr lang="en" sz="4400" dirty="0" err="1">
+              <a:rPr lang="en" sz="4400" err="1">
                 <a:solidFill>
                   <a:schemeClr val="bg1"/>
                 </a:solidFill>
@@ -12805,7 +12927,7 @@
               <a:t>Petkov</a:t>
             </a:r>
             <a:r>
-              <a:rPr lang="en" sz="4400" dirty="0">
+              <a:rPr lang="en" sz="4400">
                 <a:solidFill>
                   <a:schemeClr val="bg1"/>
                 </a:solidFill>
@@ -12814,7 +12936,7 @@
               <a:t>.</a:t>
             </a:r>
             <a:br>
-              <a:rPr lang="en-US" sz="1100" dirty="0"/>
+              <a:rPr lang="en-US" sz="1100"/>
             </a:br>
             <a:endParaRPr lang="en-US" sz="1100">
               <a:solidFill>
@@ -12976,13 +13098,13 @@
   <p:clrMapOvr>
     <a:masterClrMapping/>
   </p:clrMapOvr>
-  <mc:AlternateContent xmlns:mc="http://schemas.openxmlformats.org/markup-compatibility/2006">
-    <mc:Choice xmlns:p15="http://schemas.microsoft.com/office/powerpoint/2012/main" Requires="p15">
+  <mc:AlternateContent xmlns:mc="http://schemas.openxmlformats.org/markup-compatibility/2006" xmlns:p15="http://schemas.microsoft.com/office/powerpoint/2012/main">
+    <mc:Choice Requires="p15">
       <p:transition xmlns:p14="http://schemas.microsoft.com/office/powerpoint/2010/main" spd="slow" p14:dur="1250">
         <p15:prstTrans prst="peelOff"/>
       </p:transition>
     </mc:Choice>
-    <mc:Fallback>
+    <mc:Fallback xmlns="">
       <p:transition spd="slow">
         <p:fade/>
       </p:transition>
@@ -13273,10 +13395,10 @@
           <a:p>
             <a:pPr algn="ctr"/>
             <a:r>
-              <a:rPr lang="en-US" sz="5900" spc="-100" dirty="0"/>
+              <a:rPr lang="en-US" sz="5900" spc="-100"/>
               <a:t>Our team</a:t>
             </a:r>
-            <a:endParaRPr lang="bg-BG" dirty="0"/>
+            <a:endParaRPr lang="bg-BG"/>
           </a:p>
         </p:txBody>
       </p:sp>
@@ -13304,7 +13426,7 @@
         <p:spPr>
           <a:xfrm>
             <a:off x="199715" y="694978"/>
-            <a:ext cx="2721998" cy="3349199"/>
+            <a:ext cx="2721998" cy="3363053"/>
           </a:xfrm>
           <a:prstGeom prst="rect">
             <a:avLst/>
@@ -13422,7 +13544,7 @@
         <p:spPr>
           <a:xfrm>
             <a:off x="6205944" y="703174"/>
-            <a:ext cx="2709922" cy="3367766"/>
+            <a:ext cx="2709922" cy="3381620"/>
           </a:xfrm>
           <a:prstGeom prst="rect">
             <a:avLst/>
@@ -13481,7 +13603,7 @@
         <p:spPr>
           <a:xfrm>
             <a:off x="9227721" y="700488"/>
-            <a:ext cx="2648819" cy="3360482"/>
+            <a:ext cx="2648819" cy="3380020"/>
           </a:xfrm>
           <a:prstGeom prst="rect">
             <a:avLst/>
@@ -13528,13 +13650,13 @@
   <p:clrMapOvr>
     <a:masterClrMapping/>
   </p:clrMapOvr>
-  <mc:AlternateContent xmlns:mc="http://schemas.openxmlformats.org/markup-compatibility/2006">
-    <mc:Choice xmlns:p159="http://schemas.microsoft.com/office/powerpoint/2015/09/main" Requires="p159">
+  <mc:AlternateContent xmlns:mc="http://schemas.openxmlformats.org/markup-compatibility/2006" xmlns:p159="http://schemas.microsoft.com/office/powerpoint/2015/09/main">
+    <mc:Choice Requires="p159">
       <p:transition xmlns:p14="http://schemas.microsoft.com/office/powerpoint/2010/main" spd="slow" p14:dur="2000">
         <p159:morph option="byObject"/>
       </p:transition>
     </mc:Choice>
-    <mc:Fallback>
+    <mc:Fallback xmlns="">
       <p:transition spd="slow">
         <p:fade/>
       </p:transition>
@@ -13652,7 +13774,7 @@
           <a:lstStyle/>
           <a:p>
             <a:r>
-              <a:rPr lang="en-US" dirty="0">
+              <a:rPr lang="en-US">
                 <a:ea typeface="+mj-lt"/>
                 <a:cs typeface="+mj-lt"/>
               </a:rPr>
@@ -13660,7 +13782,7 @@
             </a:r>
           </a:p>
           <a:p>
-            <a:endParaRPr lang="en-US" dirty="0"/>
+            <a:endParaRPr lang="en-US"/>
           </a:p>
         </p:txBody>
       </p:sp>
@@ -13696,7 +13818,7 @@
               <a:buNone/>
             </a:pPr>
             <a:r>
-              <a:rPr lang="en" dirty="0">
+              <a:rPr lang="en">
                 <a:solidFill>
                   <a:srgbClr val="FFFFFF"/>
                 </a:solidFill>
@@ -13704,7 +13826,7 @@
               </a:rPr>
               <a:t>The idea of our project, was to make a game that people could have fun with and test their knowledge.</a:t>
             </a:r>
-            <a:endParaRPr lang="en-US" dirty="0">
+            <a:endParaRPr lang="en-US">
               <a:solidFill>
                 <a:srgbClr val="FFFFFF"/>
               </a:solidFill>
@@ -13790,13 +13912,13 @@
   <p:clrMapOvr>
     <a:masterClrMapping/>
   </p:clrMapOvr>
-  <mc:AlternateContent xmlns:mc="http://schemas.openxmlformats.org/markup-compatibility/2006">
-    <mc:Choice xmlns:p15="http://schemas.microsoft.com/office/powerpoint/2012/main" Requires="p15">
+  <mc:AlternateContent xmlns:mc="http://schemas.openxmlformats.org/markup-compatibility/2006" xmlns:p15="http://schemas.microsoft.com/office/powerpoint/2012/main">
+    <mc:Choice Requires="p15">
       <p:transition xmlns:p14="http://schemas.microsoft.com/office/powerpoint/2010/main" spd="slow" p14:dur="2000">
         <p15:prstTrans prst="prestige"/>
       </p:transition>
     </mc:Choice>
-    <mc:Fallback>
+    <mc:Fallback xmlns="">
       <p:transition spd="slow">
         <p:fade/>
       </p:transition>
@@ -13974,7 +14096,7 @@
           <a:lstStyle/>
           <a:p>
             <a:r>
-              <a:rPr lang="en" dirty="0">
+              <a:rPr lang="en">
                 <a:latin typeface="Consolas"/>
               </a:rPr>
               <a:t>What technologies we used and for what:</a:t>
@@ -14061,7 +14183,7 @@
         </p:blipFill>
         <p:spPr>
           <a:xfrm>
-            <a:off x="2121535" y="2576023"/>
+            <a:off x="2110951" y="2216191"/>
             <a:ext cx="1339887" cy="1405563"/>
           </a:xfrm>
           <a:prstGeom prst="rect">
@@ -14107,7 +14229,7 @@
                   <a:srgbClr val="FFFFFF"/>
                 </a:solidFill>
               </a:rPr>
-              <a:t>The code was written in C++, programming environments were repl.it and Visual Studio, GitHub to upload the code, Word for writing the documentation and Power Point for this presentation.</a:t>
+              <a:t>The code was written in C++, programming environments were repl.it and Visual Studio, GitHub to upload the code, Microsoft Teams to communicate, Microsoft Word for writing the documentation and Microsoft Power Point for this presentation.</a:t>
             </a:r>
           </a:p>
           <a:p>
@@ -14141,7 +14263,7 @@
         </p:blipFill>
         <p:spPr>
           <a:xfrm>
-            <a:off x="1924802" y="5034735"/>
+            <a:off x="1914218" y="917818"/>
             <a:ext cx="1731818" cy="885998"/>
           </a:xfrm>
           <a:prstGeom prst="rect">
@@ -14171,38 +14293,8 @@
         </p:blipFill>
         <p:spPr>
           <a:xfrm>
-            <a:off x="3501165" y="1590584"/>
+            <a:off x="3871582" y="1548250"/>
             <a:ext cx="933450" cy="918730"/>
-          </a:xfrm>
-          <a:prstGeom prst="rect">
-            <a:avLst/>
-          </a:prstGeom>
-        </p:spPr>
-      </p:pic>
-      <p:pic>
-        <p:nvPicPr>
-          <p:cNvPr id="8" name="Картина 9">
-            <a:extLst>
-              <a:ext uri="{FF2B5EF4-FFF2-40B4-BE49-F238E27FC236}">
-                <a16:creationId xmlns:a16="http://schemas.microsoft.com/office/drawing/2014/main" id="{BE8C0599-EC84-45AA-B865-12EA17452E18}"/>
-              </a:ext>
-            </a:extLst>
-          </p:cNvPr>
-          <p:cNvPicPr>
-            <a:picLocks noChangeAspect="1"/>
-          </p:cNvPicPr>
-          <p:nvPr/>
-        </p:nvPicPr>
-        <p:blipFill>
-          <a:blip r:embed="rId5"/>
-          <a:stretch>
-            <a:fillRect/>
-          </a:stretch>
-        </p:blipFill>
-        <p:spPr>
-          <a:xfrm>
-            <a:off x="508697" y="1516270"/>
-            <a:ext cx="1773382" cy="714984"/>
           </a:xfrm>
           <a:prstGeom prst="rect">
             <a:avLst/>
@@ -14224,14 +14316,14 @@
           <p:nvPr/>
         </p:nvPicPr>
         <p:blipFill>
-          <a:blip r:embed="rId6"/>
+          <a:blip r:embed="rId5"/>
           <a:stretch>
             <a:fillRect/>
           </a:stretch>
         </p:blipFill>
         <p:spPr>
           <a:xfrm>
-            <a:off x="513402" y="3789817"/>
+            <a:off x="513402" y="3366484"/>
             <a:ext cx="1177637" cy="1096449"/>
           </a:xfrm>
           <a:prstGeom prst="rect">
@@ -14254,6 +14346,36 @@
           <p:nvPr/>
         </p:nvPicPr>
         <p:blipFill>
+          <a:blip r:embed="rId6"/>
+          <a:stretch>
+            <a:fillRect/>
+          </a:stretch>
+        </p:blipFill>
+        <p:spPr>
+          <a:xfrm>
+            <a:off x="3233111" y="3427075"/>
+            <a:ext cx="1953491" cy="1302327"/>
+          </a:xfrm>
+          <a:prstGeom prst="rect">
+            <a:avLst/>
+          </a:prstGeom>
+        </p:spPr>
+      </p:pic>
+      <p:pic>
+        <p:nvPicPr>
+          <p:cNvPr id="6" name="Picture 11" descr="A picture containing drawing&#10;&#10;Description generated with very high confidence">
+            <a:extLst>
+              <a:ext uri="{FF2B5EF4-FFF2-40B4-BE49-F238E27FC236}">
+                <a16:creationId xmlns:a16="http://schemas.microsoft.com/office/drawing/2014/main" id="{1C0B919E-765C-41C8-B5EB-5A0585B47B03}"/>
+              </a:ext>
+            </a:extLst>
+          </p:cNvPr>
+          <p:cNvPicPr>
+            <a:picLocks noChangeAspect="1"/>
+          </p:cNvPicPr>
+          <p:nvPr/>
+        </p:nvPicPr>
+        <p:blipFill>
           <a:blip r:embed="rId7"/>
           <a:stretch>
             <a:fillRect/>
@@ -14261,8 +14383,38 @@
         </p:blipFill>
         <p:spPr>
           <a:xfrm>
-            <a:off x="3338945" y="3913908"/>
-            <a:ext cx="1953491" cy="1302327"/>
+            <a:off x="1976437" y="4008439"/>
+            <a:ext cx="1370542" cy="1349375"/>
+          </a:xfrm>
+          <a:prstGeom prst="rect">
+            <a:avLst/>
+          </a:prstGeom>
+        </p:spPr>
+      </p:pic>
+      <p:pic>
+        <p:nvPicPr>
+          <p:cNvPr id="15" name="Picture 15" descr="A close up of a logo&#10;&#10;Description generated with high confidence">
+            <a:extLst>
+              <a:ext uri="{FF2B5EF4-FFF2-40B4-BE49-F238E27FC236}">
+                <a16:creationId xmlns:a16="http://schemas.microsoft.com/office/drawing/2014/main" id="{BEFC424D-3ED5-4722-B915-746637253055}"/>
+              </a:ext>
+            </a:extLst>
+          </p:cNvPr>
+          <p:cNvPicPr>
+            <a:picLocks noChangeAspect="1"/>
+          </p:cNvPicPr>
+          <p:nvPr/>
+        </p:nvPicPr>
+        <p:blipFill>
+          <a:blip r:embed="rId8"/>
+          <a:stretch>
+            <a:fillRect/>
+          </a:stretch>
+        </p:blipFill>
+        <p:spPr>
+          <a:xfrm>
+            <a:off x="406400" y="1358900"/>
+            <a:ext cx="1388534" cy="1399117"/>
           </a:xfrm>
           <a:prstGeom prst="rect">
             <a:avLst/>
@@ -14279,13 +14431,13 @@
   <p:clrMapOvr>
     <a:masterClrMapping/>
   </p:clrMapOvr>
-  <mc:AlternateContent xmlns:mc="http://schemas.openxmlformats.org/markup-compatibility/2006">
-    <mc:Choice xmlns:p15="http://schemas.microsoft.com/office/powerpoint/2012/main" Requires="p15">
+  <mc:AlternateContent xmlns:mc="http://schemas.openxmlformats.org/markup-compatibility/2006" xmlns:p15="http://schemas.microsoft.com/office/powerpoint/2012/main">
+    <mc:Choice Requires="p15">
       <p:transition xmlns:p14="http://schemas.microsoft.com/office/powerpoint/2010/main" spd="slow" p14:dur="3250">
         <p15:prstTrans prst="origami"/>
       </p:transition>
     </mc:Choice>
-    <mc:Fallback>
+    <mc:Fallback xmlns="">
       <p:transition spd="slow">
         <p:fade/>
       </p:transition>
@@ -14461,13 +14613,13 @@
   <p:clrMapOvr>
     <a:masterClrMapping/>
   </p:clrMapOvr>
-  <mc:AlternateContent xmlns:mc="http://schemas.openxmlformats.org/markup-compatibility/2006">
-    <mc:Choice xmlns:p14="http://schemas.microsoft.com/office/powerpoint/2010/main" Requires="p14">
+  <mc:AlternateContent xmlns:mc="http://schemas.openxmlformats.org/markup-compatibility/2006" xmlns:p14="http://schemas.microsoft.com/office/powerpoint/2010/main">
+    <mc:Choice Requires="p14">
       <p:transition spd="slow" p14:dur="1600">
         <p14:gallery dir="l"/>
       </p:transition>
     </mc:Choice>
-    <mc:Fallback>
+    <mc:Fallback xmlns="">
       <p:transition spd="slow">
         <p:fade/>
       </p:transition>
@@ -14700,7 +14852,7 @@
                 <a:spcPts val="600"/>
               </a:spcAft>
             </a:pPr>
-            <a:endParaRPr lang="en-US" sz="5900" spc="-100" dirty="0">
+            <a:endParaRPr lang="en-US" sz="5900" spc="-100">
               <a:solidFill>
                 <a:srgbClr val="FFFFFF"/>
               </a:solidFill>
@@ -14721,13 +14873,13 @@
   <p:clrMapOvr>
     <a:masterClrMapping/>
   </p:clrMapOvr>
-  <mc:AlternateContent xmlns:mc="http://schemas.openxmlformats.org/markup-compatibility/2006">
-    <mc:Choice xmlns:p15="http://schemas.microsoft.com/office/powerpoint/2012/main" Requires="p15">
+  <mc:AlternateContent xmlns:mc="http://schemas.openxmlformats.org/markup-compatibility/2006" xmlns:p15="http://schemas.microsoft.com/office/powerpoint/2012/main">
+    <mc:Choice Requires="p15">
       <p:transition xmlns:p14="http://schemas.microsoft.com/office/powerpoint/2010/main" spd="slow" p14:dur="6000">
         <p15:prstTrans prst="curtains"/>
       </p:transition>
     </mc:Choice>
-    <mc:Fallback>
+    <mc:Fallback xmlns="">
       <p:transition spd="slow">
         <p:fade/>
       </p:transition>

</xml_diff>